<commit_message>
Presentation slides- added a few pics and that. Hope it's okay.
</commit_message>
<xml_diff>
--- a/Week 8 - Presentation slides/Mid-Term Project.pptx
+++ b/Week 8 - Presentation slides/Mid-Term Project.pptx
@@ -16,9 +16,9 @@
     <p:sldId id="259" r:id="rId7"/>
     <p:sldId id="260" r:id="rId8"/>
     <p:sldId id="267" r:id="rId9"/>
-    <p:sldId id="265" r:id="rId10"/>
-    <p:sldId id="268" r:id="rId11"/>
-    <p:sldId id="269" r:id="rId12"/>
+    <p:sldId id="268" r:id="rId10"/>
+    <p:sldId id="265" r:id="rId11"/>
+    <p:sldId id="266" r:id="rId12"/>
     <p:sldId id="261" r:id="rId13"/>
     <p:sldId id="262" r:id="rId14"/>
     <p:sldId id="263" r:id="rId15"/>
@@ -218,7 +218,7 @@
           <a:p>
             <a:fld id="{6157B527-9545-4A18-82C6-985C2D673EE0}" type="datetimeFigureOut">
               <a:rPr lang="en-US" smtClean="0"/>
-              <a:t>11/6/17</a:t>
+              <a:t>11/6/2017</a:t>
             </a:fld>
             <a:endParaRPr lang="en-US"/>
           </a:p>
@@ -383,7 +383,7 @@
           <a:p>
             <a:fld id="{A382A402-9AEC-46CD-BFFB-8C45353B9417}" type="datetimeFigureOut">
               <a:rPr lang="en-US" smtClean="0"/>
-              <a:t>11/6/17</a:t>
+              <a:t>11/6/2017</a:t>
             </a:fld>
             <a:endParaRPr lang="en-US"/>
           </a:p>
@@ -920,7 +920,7 @@
           <a:p>
             <a:fld id="{22ED8DFF-AC58-4CE1-95FC-5B760807040E}" type="datetime1">
               <a:rPr lang="en-US" smtClean="0"/>
-              <a:t>11/6/17</a:t>
+              <a:t>11/6/2017</a:t>
             </a:fld>
             <a:endParaRPr lang="en-US"/>
           </a:p>
@@ -1144,7 +1144,7 @@
           <a:p>
             <a:fld id="{AA3D4F3E-03CF-4020-A455-976DE93B6CFF}" type="datetime1">
               <a:rPr lang="en-US" smtClean="0"/>
-              <a:t>11/6/17</a:t>
+              <a:t>11/6/2017</a:t>
             </a:fld>
             <a:endParaRPr lang="en-US"/>
           </a:p>
@@ -1368,7 +1368,7 @@
           <a:p>
             <a:fld id="{3AB81425-5192-475F-8F5F-48429B4F668B}" type="datetime1">
               <a:rPr lang="en-US" smtClean="0"/>
-              <a:t>11/6/17</a:t>
+              <a:t>11/6/2017</a:t>
             </a:fld>
             <a:endParaRPr lang="en-US"/>
           </a:p>
@@ -1592,7 +1592,7 @@
           <a:p>
             <a:fld id="{C83E6289-67AB-48EA-B8F2-7F8C3C839FC8}" type="datetime1">
               <a:rPr lang="en-US" smtClean="0"/>
-              <a:t>11/6/17</a:t>
+              <a:t>11/6/2017</a:t>
             </a:fld>
             <a:endParaRPr lang="en-US"/>
           </a:p>
@@ -1876,7 +1876,7 @@
           <a:p>
             <a:fld id="{CD27007B-A0CB-4CB0-A72F-D015643D8A50}" type="datetime1">
               <a:rPr lang="en-US" smtClean="0"/>
-              <a:t>11/6/17</a:t>
+              <a:t>11/6/2017</a:t>
             </a:fld>
             <a:endParaRPr lang="en-US"/>
           </a:p>
@@ -2210,7 +2210,7 @@
           <a:p>
             <a:fld id="{7AF78760-02B0-4343-9B36-9B01060F90A6}" type="datetime1">
               <a:rPr lang="en-US" smtClean="0"/>
-              <a:t>11/6/17</a:t>
+              <a:t>11/6/2017</a:t>
             </a:fld>
             <a:endParaRPr lang="en-US"/>
           </a:p>
@@ -2761,7 +2761,7 @@
           <a:p>
             <a:fld id="{D6103C8C-96CC-4988-9A76-A97C68B37C96}" type="datetime1">
               <a:rPr lang="en-US" smtClean="0"/>
-              <a:t>11/6/17</a:t>
+              <a:t>11/6/2017</a:t>
             </a:fld>
             <a:endParaRPr lang="en-US"/>
           </a:p>
@@ -2941,7 +2941,7 @@
           <a:p>
             <a:fld id="{19A6AA83-E69F-4B8F-8330-2B08940C21DF}" type="datetime1">
               <a:rPr lang="en-US" smtClean="0"/>
-              <a:t>11/6/17</a:t>
+              <a:t>11/6/2017</a:t>
             </a:fld>
             <a:endParaRPr lang="en-US"/>
           </a:p>
@@ -3075,7 +3075,7 @@
           <a:p>
             <a:fld id="{0C32B54B-DAC7-463C-B2D9-3A5324E66E07}" type="datetime1">
               <a:rPr lang="en-US" smtClean="0"/>
-              <a:t>11/6/17</a:t>
+              <a:t>11/6/2017</a:t>
             </a:fld>
             <a:endParaRPr lang="en-US"/>
           </a:p>
@@ -3397,7 +3397,7 @@
           <a:p>
             <a:fld id="{FABC3EB9-8141-418F-8EFF-9A68D158E203}" type="datetime1">
               <a:rPr lang="en-US" smtClean="0"/>
-              <a:t>11/6/17</a:t>
+              <a:t>11/6/2017</a:t>
             </a:fld>
             <a:endParaRPr lang="en-US"/>
           </a:p>
@@ -3880,7 +3880,7 @@
           <a:p>
             <a:fld id="{EE203F9F-5B53-4206-BA20-257056A7933C}" type="datetime1">
               <a:rPr lang="en-US" smtClean="0"/>
-              <a:t>11/6/17</a:t>
+              <a:t>11/6/2017</a:t>
             </a:fld>
             <a:endParaRPr lang="en-US"/>
           </a:p>
@@ -4273,7 +4273,7 @@
             <a:fld id="{B051F468-2565-4472-9079-46A542F179AB}" type="datetime1">
               <a:rPr lang="en-US" smtClean="0"/>
               <a:pPr/>
-              <a:t>11/6/17</a:t>
+              <a:t>11/6/2017</a:t>
             </a:fld>
             <a:endParaRPr lang="en-US"/>
           </a:p>
@@ -4795,13 +4795,20 @@
             <p:ph type="ctrTitle"/>
           </p:nvPr>
         </p:nvSpPr>
-        <p:spPr/>
-        <p:txBody>
-          <a:bodyPr/>
+        <p:spPr>
+          <a:xfrm>
+            <a:off x="3217281" y="624468"/>
+            <a:ext cx="7259134" cy="1197909"/>
+          </a:xfrm>
+        </p:spPr>
+        <p:txBody>
+          <a:bodyPr>
+            <a:noAutofit/>
+          </a:bodyPr>
           <a:lstStyle/>
           <a:p>
             <a:r>
-              <a:rPr lang="en-US" dirty="0"/>
+              <a:rPr lang="en-US" sz="6000" dirty="0"/>
               <a:t>Mid-Term Project</a:t>
             </a:r>
           </a:p>
@@ -4882,6 +4889,36 @@
           </a:p>
         </p:txBody>
       </p:sp>
+      <p:pic>
+        <p:nvPicPr>
+          <p:cNvPr id="4" name="Picture 3"/>
+          <p:cNvPicPr>
+            <a:picLocks noChangeAspect="1"/>
+          </p:cNvPicPr>
+          <p:nvPr/>
+        </p:nvPicPr>
+        <p:blipFill>
+          <a:blip r:embed="rId3">
+            <a:extLst>
+              <a:ext uri="{28A0092B-C50C-407E-A947-70E740481C1C}">
+                <a14:useLocalDpi xmlns:a14="http://schemas.microsoft.com/office/drawing/2010/main" val="0"/>
+              </a:ext>
+            </a:extLst>
+          </a:blip>
+          <a:stretch>
+            <a:fillRect/>
+          </a:stretch>
+        </p:blipFill>
+        <p:spPr>
+          <a:xfrm>
+            <a:off x="5374887" y="1822377"/>
+            <a:ext cx="2943922" cy="1555984"/>
+          </a:xfrm>
+          <a:prstGeom prst="rect">
+            <a:avLst/>
+          </a:prstGeom>
+        </p:spPr>
+      </p:pic>
     </p:spTree>
     <p:extLst>
       <p:ext uri="{BB962C8B-B14F-4D97-AF65-F5344CB8AC3E}">
@@ -5124,7 +5161,45 @@
           <a:p>
             <a:r>
               <a:rPr lang="en-IE" dirty="0"/>
-              <a:t>&lt;Use Harvard References&gt;</a:t>
+              <a:t>&lt;Use Harvard References</a:t>
+            </a:r>
+            <a:r>
+              <a:rPr lang="en-IE" dirty="0" smtClean="0"/>
+              <a:t>&gt;</a:t>
+            </a:r>
+          </a:p>
+          <a:p>
+            <a:r>
+              <a:rPr lang="en-IE" dirty="0" smtClean="0"/>
+              <a:t>Link to a website I read an article on </a:t>
+            </a:r>
+            <a:r>
+              <a:rPr lang="en-IE" dirty="0" err="1" smtClean="0"/>
+              <a:t>Encrytion</a:t>
+            </a:r>
+            <a:r>
+              <a:rPr lang="en-IE" dirty="0" smtClean="0"/>
+              <a:t> and hashing for Security of </a:t>
+            </a:r>
+            <a:r>
+              <a:rPr lang="en-IE" dirty="0"/>
+              <a:t>a password: </a:t>
+            </a:r>
+            <a:r>
+              <a:rPr lang="en-IE" dirty="0">
+                <a:hlinkClick r:id="rId2"/>
+              </a:rPr>
+              <a:t>https://benlog.com/2008/06/19/dont-hash-secrets</a:t>
+            </a:r>
+            <a:r>
+              <a:rPr lang="en-IE" dirty="0" smtClean="0">
+                <a:hlinkClick r:id="rId2"/>
+              </a:rPr>
+              <a:t>/</a:t>
+            </a:r>
+            <a:r>
+              <a:rPr lang="en-IE" dirty="0" smtClean="0"/>
+              <a:t> (Charlene)- I will convert to Harvard in morning.</a:t>
             </a:r>
             <a:endParaRPr lang="en-US" dirty="0"/>
           </a:p>
@@ -5443,7 +5518,7 @@
           <p:cNvPr id="3" name="Content Placeholder 2">
             <a:extLst>
               <a:ext uri="{FF2B5EF4-FFF2-40B4-BE49-F238E27FC236}">
-                <a16:creationId xmlns:a16="http://schemas.microsoft.com/office/drawing/2014/main" xmlns="" id="{B4035E33-1D6D-4C43-A323-FED518B68368}"/>
+                <a16:creationId xmlns:a16="http://schemas.microsoft.com/office/drawing/2014/main" id="{B4035E33-1D6D-4C43-A323-FED518B68368}"/>
               </a:ext>
             </a:extLst>
           </p:cNvPr>
@@ -5601,7 +5676,7 @@
           <p:cNvPr id="5" name="Content Placeholder 4">
             <a:extLst>
               <a:ext uri="{FF2B5EF4-FFF2-40B4-BE49-F238E27FC236}">
-                <a16:creationId xmlns:a16="http://schemas.microsoft.com/office/drawing/2014/main" xmlns="" id="{BC1A1351-9851-4557-8D26-8DDAB88EB3C4}"/>
+                <a16:creationId xmlns:a16="http://schemas.microsoft.com/office/drawing/2014/main" id="{BC1A1351-9851-4557-8D26-8DDAB88EB3C4}"/>
               </a:ext>
             </a:extLst>
           </p:cNvPr>
@@ -6043,12 +6118,8 @@
             </a:r>
           </a:p>
           <a:p>
-            <a:pPr>
-              <a:buFont typeface="Wingdings" panose="05000000000000000000" pitchFamily="2" charset="2"/>
-              <a:buChar char="ü"/>
-            </a:pPr>
-            <a:r>
-              <a:rPr lang="en-GB" dirty="0" smtClean="0"/>
+            <a:r>
+              <a:rPr lang="en-GB" u="sng" dirty="0" smtClean="0"/>
               <a:t>Sign In.</a:t>
             </a:r>
           </a:p>
@@ -6218,106 +6289,376 @@
             <p:ph type="title"/>
           </p:nvPr>
         </p:nvSpPr>
-        <p:spPr/>
+        <p:spPr>
+          <a:xfrm>
+            <a:off x="1914524" y="35127"/>
+            <a:ext cx="9997440" cy="1143000"/>
+          </a:xfrm>
+        </p:spPr>
         <p:txBody>
           <a:bodyPr>
-            <a:normAutofit/>
+            <a:normAutofit fontScale="90000"/>
           </a:bodyPr>
           <a:lstStyle/>
           <a:p>
             <a:r>
-              <a:rPr lang="en-IE" sz="3600" u="sng" dirty="0" smtClean="0"/>
-              <a:t>PAYMENT GETAWAY SYSTEM</a:t>
-            </a:r>
-            <a:endParaRPr lang="en-IE" sz="3600" u="sng" dirty="0"/>
-          </a:p>
-        </p:txBody>
-      </p:sp>
-      <p:sp>
-        <p:nvSpPr>
-          <p:cNvPr id="3" name="Content Placeholder 2"/>
-          <p:cNvSpPr>
-            <a:spLocks noGrp="1"/>
-          </p:cNvSpPr>
-          <p:nvPr>
-            <p:ph idx="1"/>
-          </p:nvPr>
-        </p:nvSpPr>
-        <p:spPr/>
+              <a:rPr lang="en-IE" dirty="0" smtClean="0"/>
+              <a:t>How I plan to connect the login to the database:</a:t>
+            </a:r>
+            <a:endParaRPr lang="en-IE" dirty="0"/>
+          </a:p>
+        </p:txBody>
+      </p:sp>
+      <p:sp>
+        <p:nvSpPr>
+          <p:cNvPr id="4" name="Content Placeholder 3"/>
+          <p:cNvSpPr>
+            <a:spLocks noGrp="1"/>
+          </p:cNvSpPr>
+          <p:nvPr>
+            <p:ph sz="half" idx="2"/>
+          </p:nvPr>
+        </p:nvSpPr>
+        <p:spPr>
+          <a:xfrm>
+            <a:off x="7170614" y="1178127"/>
+            <a:ext cx="4741350" cy="5534907"/>
+          </a:xfrm>
+        </p:spPr>
         <p:txBody>
           <a:bodyPr>
-            <a:normAutofit/>
+            <a:normAutofit fontScale="92500" lnSpcReduction="20000"/>
           </a:bodyPr>
           <a:lstStyle/>
           <a:p>
             <a:r>
-              <a:rPr lang="en-GB" dirty="0" smtClean="0"/>
-              <a:t>Protect credit cards details encrypting sensitive information </a:t>
-            </a:r>
-          </a:p>
-          <a:p>
-            <a:endParaRPr lang="en-GB" dirty="0" smtClean="0"/>
-          </a:p>
-          <a:p>
-            <a:r>
-              <a:rPr lang="en-GB" dirty="0" smtClean="0"/>
-              <a:t>It ensure that information pass securely. </a:t>
-            </a:r>
-          </a:p>
-          <a:p>
-            <a:endParaRPr lang="en-GB" dirty="0"/>
-          </a:p>
-          <a:p>
-            <a:r>
-              <a:rPr lang="en-GB" dirty="0" smtClean="0">
-                <a:solidFill>
-                  <a:schemeClr val="accent2">
-                    <a:lumMod val="75000"/>
-                  </a:schemeClr>
-                </a:solidFill>
-              </a:rPr>
-              <a:t>Security </a:t>
-            </a:r>
-          </a:p>
-          <a:p>
-            <a:r>
-              <a:rPr lang="en-GB" dirty="0" smtClean="0"/>
-              <a:t>Customers will be asked to enter their details when making payment. </a:t>
-            </a:r>
-          </a:p>
-          <a:p>
-            <a:endParaRPr lang="en-GB" dirty="0" smtClean="0"/>
+              <a:rPr lang="en-IE" dirty="0" smtClean="0"/>
+              <a:t>&lt;?php</a:t>
+            </a:r>
+          </a:p>
+          <a:p>
+            <a:pPr marL="82296" indent="0">
+              <a:buNone/>
+            </a:pPr>
+            <a:r>
+              <a:rPr lang="en-IE" dirty="0" smtClean="0"/>
+              <a:t>	(“our.hostaddress.co		m”,”username”,”pass	word”) or 		die(</a:t>
+            </a:r>
+            <a:r>
+              <a:rPr lang="en-IE" dirty="0" err="1" smtClean="0"/>
+              <a:t>mysql.error</a:t>
+            </a:r>
+            <a:r>
+              <a:rPr lang="en-IE" dirty="0" smtClean="0"/>
+              <a:t>()); 		mysql_select_db(“Gol	den_Years)or die 	(mysql_error());</a:t>
+            </a:r>
+          </a:p>
+          <a:p>
+            <a:pPr marL="82296" indent="0">
+              <a:buNone/>
+            </a:pPr>
+            <a:endParaRPr lang="en-IE" dirty="0"/>
+          </a:p>
+          <a:p>
+            <a:pPr marL="82296" indent="0">
+              <a:buNone/>
+            </a:pPr>
+            <a:r>
+              <a:rPr lang="en-IE" dirty="0" smtClean="0"/>
+              <a:t>//Connects to GoldenYearsBooking Database to store user’s information.</a:t>
+            </a:r>
+            <a:endParaRPr lang="en-IE" dirty="0"/>
           </a:p>
         </p:txBody>
       </p:sp>
       <p:pic>
         <p:nvPicPr>
-          <p:cNvPr id="4" name="Picture 3"/>
+          <p:cNvPr id="7" name="Content Placeholder 6"/>
           <p:cNvPicPr>
-            <a:picLocks noChangeAspect="1"/>
+            <a:picLocks noGrp="1" noChangeAspect="1"/>
           </p:cNvPicPr>
-          <p:nvPr/>
+          <p:nvPr>
+            <p:ph sz="half" idx="1"/>
+          </p:nvPr>
         </p:nvPicPr>
         <p:blipFill>
-          <a:blip r:embed="rId2"/>
+          <a:blip r:embed="rId2">
+            <a:extLst>
+              <a:ext uri="{28A0092B-C50C-407E-A947-70E740481C1C}">
+                <a14:useLocalDpi xmlns:a14="http://schemas.microsoft.com/office/drawing/2010/main" val="0"/>
+              </a:ext>
+            </a:extLst>
+          </a:blip>
           <a:stretch>
             <a:fillRect/>
           </a:stretch>
         </p:blipFill>
         <p:spPr>
           <a:xfrm>
-            <a:off x="9889987" y="46141"/>
-            <a:ext cx="1586396" cy="1599994"/>
-          </a:xfrm>
-          <a:prstGeom prst="rect">
-            <a:avLst/>
-          </a:prstGeom>
+            <a:off x="1914524" y="1178126"/>
+            <a:ext cx="5120259" cy="5534907"/>
+          </a:xfrm>
         </p:spPr>
       </p:pic>
+      <p:sp>
+        <p:nvSpPr>
+          <p:cNvPr id="8" name="TextBox 7"/>
+          <p:cNvSpPr txBox="1"/>
+          <p:nvPr/>
+        </p:nvSpPr>
+        <p:spPr>
+          <a:xfrm>
+            <a:off x="5274527" y="1895707"/>
+            <a:ext cx="1516797" cy="1754326"/>
+          </a:xfrm>
+          <a:prstGeom prst="rect">
+            <a:avLst/>
+          </a:prstGeom>
+          <a:noFill/>
+        </p:spPr>
+        <p:txBody>
+          <a:bodyPr wrap="square" rtlCol="0">
+            <a:spAutoFit/>
+          </a:bodyPr>
+          <a:lstStyle/>
+          <a:p>
+            <a:r>
+              <a:rPr lang="en-IE" dirty="0" smtClean="0"/>
+              <a:t>//This is the information that will be stored if you are a user.</a:t>
+            </a:r>
+            <a:endParaRPr lang="en-IE" dirty="0"/>
+          </a:p>
+        </p:txBody>
+      </p:sp>
+      <p:sp>
+        <p:nvSpPr>
+          <p:cNvPr id="9" name="TextBox 8"/>
+          <p:cNvSpPr txBox="1"/>
+          <p:nvPr/>
+        </p:nvSpPr>
+        <p:spPr>
+          <a:xfrm rot="20966746">
+            <a:off x="4964665" y="1437435"/>
+            <a:ext cx="825947" cy="276999"/>
+          </a:xfrm>
+          <a:prstGeom prst="rect">
+            <a:avLst/>
+          </a:prstGeom>
+        </p:spPr>
+        <p:style>
+          <a:lnRef idx="2">
+            <a:schemeClr val="accent2">
+              <a:shade val="50000"/>
+            </a:schemeClr>
+          </a:lnRef>
+          <a:fillRef idx="1">
+            <a:schemeClr val="accent2"/>
+          </a:fillRef>
+          <a:effectRef idx="0">
+            <a:schemeClr val="accent2"/>
+          </a:effectRef>
+          <a:fontRef idx="minor">
+            <a:schemeClr val="lt1"/>
+          </a:fontRef>
+        </p:style>
+        <p:txBody>
+          <a:bodyPr wrap="square" rtlCol="0">
+            <a:spAutoFit/>
+          </a:bodyPr>
+          <a:lstStyle/>
+          <a:p>
+            <a:r>
+              <a:rPr lang="en-IE" sz="1200" dirty="0" smtClean="0"/>
+              <a:t>Login_id</a:t>
+            </a:r>
+            <a:endParaRPr lang="en-IE" sz="1200" dirty="0"/>
+          </a:p>
+        </p:txBody>
+      </p:sp>
+      <p:sp>
+        <p:nvSpPr>
+          <p:cNvPr id="10" name="TextBox 9"/>
+          <p:cNvSpPr txBox="1"/>
+          <p:nvPr/>
+        </p:nvSpPr>
+        <p:spPr>
+          <a:xfrm rot="700227">
+            <a:off x="5035301" y="4256189"/>
+            <a:ext cx="981308" cy="261610"/>
+          </a:xfrm>
+          <a:prstGeom prst="rect">
+            <a:avLst/>
+          </a:prstGeom>
+        </p:spPr>
+        <p:style>
+          <a:lnRef idx="2">
+            <a:schemeClr val="accent2">
+              <a:shade val="50000"/>
+            </a:schemeClr>
+          </a:lnRef>
+          <a:fillRef idx="1">
+            <a:schemeClr val="accent2"/>
+          </a:fillRef>
+          <a:effectRef idx="0">
+            <a:schemeClr val="accent2"/>
+          </a:effectRef>
+          <a:fontRef idx="minor">
+            <a:schemeClr val="lt1"/>
+          </a:fontRef>
+        </p:style>
+        <p:txBody>
+          <a:bodyPr wrap="square" rtlCol="0">
+            <a:spAutoFit/>
+          </a:bodyPr>
+          <a:lstStyle/>
+          <a:p>
+            <a:r>
+              <a:rPr lang="en-IE" sz="1100" dirty="0" smtClean="0"/>
+              <a:t>Login_date</a:t>
+            </a:r>
+            <a:endParaRPr lang="en-IE" sz="1100" dirty="0"/>
+          </a:p>
+        </p:txBody>
+      </p:sp>
+      <p:sp>
+        <p:nvSpPr>
+          <p:cNvPr id="11" name="TextBox 10"/>
+          <p:cNvSpPr txBox="1"/>
+          <p:nvPr/>
+        </p:nvSpPr>
+        <p:spPr>
+          <a:xfrm rot="21290621">
+            <a:off x="5473315" y="4961433"/>
+            <a:ext cx="1119217" cy="276999"/>
+          </a:xfrm>
+          <a:prstGeom prst="rect">
+            <a:avLst/>
+          </a:prstGeom>
+        </p:spPr>
+        <p:style>
+          <a:lnRef idx="2">
+            <a:schemeClr val="accent2">
+              <a:shade val="50000"/>
+            </a:schemeClr>
+          </a:lnRef>
+          <a:fillRef idx="1">
+            <a:schemeClr val="accent2"/>
+          </a:fillRef>
+          <a:effectRef idx="0">
+            <a:schemeClr val="accent2"/>
+          </a:effectRef>
+          <a:fontRef idx="minor">
+            <a:schemeClr val="lt1"/>
+          </a:fontRef>
+        </p:style>
+        <p:txBody>
+          <a:bodyPr wrap="none" rtlCol="0">
+            <a:spAutoFit/>
+          </a:bodyPr>
+          <a:lstStyle/>
+          <a:p>
+            <a:r>
+              <a:rPr lang="en-IE" sz="1200" dirty="0" smtClean="0"/>
+              <a:t>Customer_id</a:t>
+            </a:r>
+            <a:endParaRPr lang="en-IE" sz="1200" dirty="0"/>
+          </a:p>
+        </p:txBody>
+      </p:sp>
+      <p:sp>
+        <p:nvSpPr>
+          <p:cNvPr id="12" name="TextBox 11"/>
+          <p:cNvSpPr txBox="1"/>
+          <p:nvPr/>
+        </p:nvSpPr>
+        <p:spPr>
+          <a:xfrm rot="21395639">
+            <a:off x="5816342" y="3723789"/>
+            <a:ext cx="997389" cy="276999"/>
+          </a:xfrm>
+          <a:prstGeom prst="rect">
+            <a:avLst/>
+          </a:prstGeom>
+        </p:spPr>
+        <p:style>
+          <a:lnRef idx="2">
+            <a:schemeClr val="accent2">
+              <a:shade val="50000"/>
+            </a:schemeClr>
+          </a:lnRef>
+          <a:fillRef idx="1">
+            <a:schemeClr val="accent2"/>
+          </a:fillRef>
+          <a:effectRef idx="0">
+            <a:schemeClr val="accent2"/>
+          </a:effectRef>
+          <a:fontRef idx="minor">
+            <a:schemeClr val="lt1"/>
+          </a:fontRef>
+        </p:style>
+        <p:txBody>
+          <a:bodyPr wrap="none" rtlCol="0">
+            <a:spAutoFit/>
+          </a:bodyPr>
+          <a:lstStyle/>
+          <a:p>
+            <a:r>
+              <a:rPr lang="en-IE" sz="1200" dirty="0" smtClean="0"/>
+              <a:t>business_id</a:t>
+            </a:r>
+            <a:endParaRPr lang="en-IE" sz="1200" dirty="0"/>
+          </a:p>
+        </p:txBody>
+      </p:sp>
+      <p:sp>
+        <p:nvSpPr>
+          <p:cNvPr id="13" name="TextBox 12"/>
+          <p:cNvSpPr txBox="1"/>
+          <p:nvPr/>
+        </p:nvSpPr>
+        <p:spPr>
+          <a:xfrm rot="304540">
+            <a:off x="5018905" y="5710666"/>
+            <a:ext cx="1763624" cy="276999"/>
+          </a:xfrm>
+          <a:prstGeom prst="rect">
+            <a:avLst/>
+          </a:prstGeom>
+        </p:spPr>
+        <p:style>
+          <a:lnRef idx="2">
+            <a:schemeClr val="accent2">
+              <a:shade val="50000"/>
+            </a:schemeClr>
+          </a:lnRef>
+          <a:fillRef idx="1">
+            <a:schemeClr val="accent2"/>
+          </a:fillRef>
+          <a:effectRef idx="0">
+            <a:schemeClr val="accent2"/>
+          </a:effectRef>
+          <a:fontRef idx="minor">
+            <a:schemeClr val="lt1"/>
+          </a:fontRef>
+        </p:style>
+        <p:txBody>
+          <a:bodyPr wrap="none" rtlCol="0">
+            <a:spAutoFit/>
+          </a:bodyPr>
+          <a:lstStyle/>
+          <a:p>
+            <a:r>
+              <a:rPr lang="en-IE" sz="1200" dirty="0" smtClean="0"/>
+              <a:t>Password_encryption</a:t>
+            </a:r>
+            <a:endParaRPr lang="en-IE" sz="1200" dirty="0"/>
+          </a:p>
+        </p:txBody>
+      </p:sp>
     </p:spTree>
     <p:extLst>
       <p:ext uri="{BB962C8B-B14F-4D97-AF65-F5344CB8AC3E}">
-        <p14:creationId xmlns:p14="http://schemas.microsoft.com/office/powerpoint/2010/main" val="1404321925"/>
+        <p14:creationId xmlns:p14="http://schemas.microsoft.com/office/powerpoint/2010/main" val="3443293976"/>
       </p:ext>
     </p:extLst>
   </p:cSld>
@@ -6368,176 +6709,103 @@
         </p:nvSpPr>
         <p:spPr/>
         <p:txBody>
-          <a:bodyPr/>
-          <a:lstStyle/>
-          <a:p>
-            <a:r>
-              <a:rPr lang="en-US" dirty="0" smtClean="0"/>
-              <a:t>PAYMENT SECURITY CONT</a:t>
-            </a:r>
-            <a:r>
-              <a:rPr lang="mr-IN" dirty="0" smtClean="0"/>
-              <a:t>…</a:t>
-            </a:r>
-            <a:endParaRPr lang="en-US" dirty="0"/>
-          </a:p>
-        </p:txBody>
-      </p:sp>
-      <p:sp>
-        <p:nvSpPr>
-          <p:cNvPr id="3" name="Content Placeholder 2"/>
-          <p:cNvSpPr>
-            <a:spLocks noGrp="1"/>
-          </p:cNvSpPr>
-          <p:nvPr>
-            <p:ph idx="1"/>
-          </p:nvPr>
-        </p:nvSpPr>
-        <p:spPr/>
-        <p:txBody>
           <a:bodyPr>
-            <a:normAutofit lnSpcReduction="10000"/>
+            <a:normAutofit/>
           </a:bodyPr>
           <a:lstStyle/>
           <a:p>
             <a:r>
-              <a:rPr lang="en-GB" dirty="0" smtClean="0">
-                <a:solidFill>
-                  <a:schemeClr val="tx2">
-                    <a:lumMod val="50000"/>
-                  </a:schemeClr>
-                </a:solidFill>
-              </a:rPr>
-              <a:t>The entire communication of the ‘submit page’ </a:t>
-            </a:r>
-            <a:r>
-              <a:rPr lang="en-GB" dirty="0">
-                <a:solidFill>
-                  <a:schemeClr val="tx2">
-                    <a:lumMod val="50000"/>
-                  </a:schemeClr>
-                </a:solidFill>
-              </a:rPr>
-              <a:t>will be carried out by http protocol </a:t>
-            </a:r>
-            <a:endParaRPr lang="en-GB" dirty="0" smtClean="0">
-              <a:solidFill>
-                <a:schemeClr val="tx2">
-                  <a:lumMod val="50000"/>
-                </a:schemeClr>
-              </a:solidFill>
-            </a:endParaRPr>
-          </a:p>
-          <a:p>
-            <a:endParaRPr lang="en-GB" dirty="0">
-              <a:solidFill>
-                <a:schemeClr val="tx2">
-                  <a:lumMod val="50000"/>
-                </a:schemeClr>
-              </a:solidFill>
-            </a:endParaRPr>
-          </a:p>
-          <a:p>
-            <a:r>
-              <a:rPr lang="en-GB" dirty="0" smtClean="0">
-                <a:solidFill>
-                  <a:schemeClr val="tx2">
-                    <a:lumMod val="50000"/>
-                  </a:schemeClr>
-                </a:solidFill>
-              </a:rPr>
-              <a:t> The payment network provides process and service </a:t>
-            </a:r>
-          </a:p>
-          <a:p>
-            <a:endParaRPr lang="en-GB" dirty="0" smtClean="0">
-              <a:solidFill>
-                <a:schemeClr val="tx2">
-                  <a:lumMod val="50000"/>
-                </a:schemeClr>
-              </a:solidFill>
-            </a:endParaRPr>
-          </a:p>
-          <a:p>
-            <a:pPr marL="82296" indent="0">
-              <a:buNone/>
-            </a:pPr>
-            <a:r>
-              <a:rPr lang="en-GB" dirty="0" smtClean="0">
-                <a:solidFill>
-                  <a:srgbClr val="7B3D17"/>
-                </a:solidFill>
-              </a:rPr>
-              <a:t>Process</a:t>
-            </a:r>
-          </a:p>
-          <a:p>
-            <a:r>
-              <a:rPr lang="en-GB" dirty="0" smtClean="0">
-                <a:solidFill>
-                  <a:schemeClr val="tx2">
-                    <a:lumMod val="50000"/>
-                  </a:schemeClr>
-                </a:solidFill>
-              </a:rPr>
-              <a:t>Authorisation </a:t>
-            </a:r>
-          </a:p>
-          <a:p>
-            <a:r>
-              <a:rPr lang="en-GB" dirty="0" smtClean="0">
-                <a:solidFill>
-                  <a:schemeClr val="tx2">
-                    <a:lumMod val="50000"/>
-                  </a:schemeClr>
-                </a:solidFill>
-              </a:rPr>
-              <a:t>Settlement </a:t>
-            </a:r>
-            <a:endParaRPr lang="en-GB" dirty="0">
-              <a:solidFill>
-                <a:schemeClr val="tx2">
-                  <a:lumMod val="50000"/>
-                </a:schemeClr>
-              </a:solidFill>
-            </a:endParaRPr>
-          </a:p>
-          <a:p>
-            <a:endParaRPr lang="en-US" dirty="0" smtClean="0"/>
-          </a:p>
-          <a:p>
-            <a:endParaRPr lang="en-US" dirty="0"/>
-          </a:p>
-        </p:txBody>
-      </p:sp>
-      <p:pic>
-        <p:nvPicPr>
-          <p:cNvPr id="4" name="Picture 3"/>
-          <p:cNvPicPr>
-            <a:picLocks noChangeAspect="1"/>
-          </p:cNvPicPr>
-          <p:nvPr/>
-        </p:nvPicPr>
-        <p:blipFill>
-          <a:blip r:embed="rId2"/>
-          <a:stretch>
-            <a:fillRect/>
-          </a:stretch>
-        </p:blipFill>
-        <p:spPr>
-          <a:xfrm>
-            <a:off x="6575287" y="4280450"/>
-            <a:ext cx="3410764" cy="1855857"/>
-          </a:xfrm>
-          <a:prstGeom prst="rect">
-            <a:avLst/>
-          </a:prstGeom>
-        </p:spPr>
-      </p:pic>
+              <a:rPr lang="en-GB" sz="3600" u="sng" dirty="0" smtClean="0"/>
+              <a:t>Payment System:</a:t>
+            </a:r>
+            <a:endParaRPr lang="en-IE" sz="3600" u="sng" dirty="0"/>
+          </a:p>
+        </p:txBody>
+      </p:sp>
+      <p:sp>
+        <p:nvSpPr>
+          <p:cNvPr id="3" name="Content Placeholder 2"/>
+          <p:cNvSpPr>
+            <a:spLocks noGrp="1"/>
+          </p:cNvSpPr>
+          <p:nvPr>
+            <p:ph idx="1"/>
+          </p:nvPr>
+        </p:nvSpPr>
+        <p:spPr/>
+        <p:txBody>
+          <a:bodyPr>
+            <a:normAutofit fontScale="92500" lnSpcReduction="10000"/>
+          </a:bodyPr>
+          <a:lstStyle/>
+          <a:p>
+            <a:r>
+              <a:rPr lang="en-GB" dirty="0"/>
+              <a:t>Adding  event to </a:t>
+            </a:r>
+            <a:r>
+              <a:rPr lang="en-GB" dirty="0" smtClean="0"/>
+              <a:t>cart</a:t>
+            </a:r>
+          </a:p>
+          <a:p>
+            <a:r>
+              <a:rPr lang="en-GB" dirty="0" smtClean="0"/>
+              <a:t>Security / Encryption</a:t>
+            </a:r>
+          </a:p>
+          <a:p>
+            <a:r>
+              <a:rPr lang="en-GB" dirty="0" smtClean="0"/>
+              <a:t>Card details. </a:t>
+            </a:r>
+          </a:p>
+          <a:p>
+            <a:r>
+              <a:rPr lang="en-GB" dirty="0" smtClean="0"/>
+              <a:t>Cookies</a:t>
+            </a:r>
+          </a:p>
+          <a:p>
+            <a:r>
+              <a:rPr lang="en-GB" dirty="0" smtClean="0"/>
+              <a:t>Acceptance</a:t>
+            </a:r>
+            <a:r>
+              <a:rPr lang="en-GB" dirty="0"/>
+              <a:t>/ Verification </a:t>
+            </a:r>
+            <a:r>
+              <a:rPr lang="en-GB" dirty="0" smtClean="0"/>
+              <a:t>of payment </a:t>
+            </a:r>
+            <a:r>
+              <a:rPr lang="en-GB" dirty="0"/>
+              <a:t>( credit cards only</a:t>
+            </a:r>
+            <a:r>
+              <a:rPr lang="en-GB" dirty="0" smtClean="0"/>
+              <a:t>)</a:t>
+            </a:r>
+          </a:p>
+          <a:p>
+            <a:r>
+              <a:rPr lang="en-GB" dirty="0" smtClean="0"/>
+              <a:t>After booking it automatically adds to our booking Calendar.</a:t>
+            </a:r>
+          </a:p>
+          <a:p>
+            <a:r>
+              <a:rPr lang="en-GB" dirty="0" smtClean="0"/>
+              <a:t>Automatic confirmation email sent to confirm payment and booking.</a:t>
+            </a:r>
+          </a:p>
+        </p:txBody>
+      </p:sp>
     </p:spTree>
     <p:extLst>
       <p:ext uri="{BB962C8B-B14F-4D97-AF65-F5344CB8AC3E}">
-        <p14:creationId xmlns:p14="http://schemas.microsoft.com/office/powerpoint/2010/main" val="2018108424"/>
+        <p14:creationId xmlns:p14="http://schemas.microsoft.com/office/powerpoint/2010/main" val="1404321925"/>
       </p:ext>
     </p:extLst>
   </p:cSld>
@@ -6578,112 +6846,122 @@
       </p:grpSpPr>
       <p:sp>
         <p:nvSpPr>
-          <p:cNvPr id="2" name="Title 1"/>
-          <p:cNvSpPr>
-            <a:spLocks noGrp="1"/>
-          </p:cNvSpPr>
-          <p:nvPr>
-            <p:ph type="title"/>
-          </p:nvPr>
-        </p:nvSpPr>
-        <p:spPr/>
+          <p:cNvPr id="3" name="Text Placeholder 2"/>
+          <p:cNvSpPr>
+            <a:spLocks noGrp="1"/>
+          </p:cNvSpPr>
+          <p:nvPr>
+            <p:ph type="body" idx="1"/>
+          </p:nvPr>
+        </p:nvSpPr>
+        <p:spPr>
+          <a:xfrm>
+            <a:off x="391885" y="186781"/>
+            <a:ext cx="5427024" cy="640080"/>
+          </a:xfrm>
+        </p:spPr>
         <p:txBody>
           <a:bodyPr/>
           <a:lstStyle/>
           <a:p>
             <a:r>
-              <a:rPr lang="en-US" dirty="0" smtClean="0"/>
-              <a:t>Service:</a:t>
-            </a:r>
-            <a:endParaRPr lang="en-US" dirty="0"/>
-          </a:p>
-        </p:txBody>
-      </p:sp>
-      <p:sp>
-        <p:nvSpPr>
-          <p:cNvPr id="3" name="Content Placeholder 2"/>
-          <p:cNvSpPr>
-            <a:spLocks noGrp="1"/>
-          </p:cNvSpPr>
-          <p:nvPr>
-            <p:ph idx="1"/>
-          </p:nvPr>
-        </p:nvSpPr>
-        <p:spPr/>
-        <p:txBody>
-          <a:bodyPr/>
-          <a:lstStyle/>
-          <a:p>
-            <a:pPr marL="82296" indent="0">
-              <a:buNone/>
-            </a:pPr>
-            <a:r>
-              <a:rPr lang="en-US" dirty="0" smtClean="0"/>
-              <a:t>Payment processing service:</a:t>
-            </a:r>
-          </a:p>
-          <a:p>
-            <a:endParaRPr lang="en-US" dirty="0"/>
-          </a:p>
-          <a:p>
-            <a:r>
-              <a:rPr lang="en-US" dirty="0"/>
-              <a:t>C</a:t>
-            </a:r>
-            <a:r>
-              <a:rPr lang="en-US" dirty="0" smtClean="0"/>
-              <a:t>onnecting the customers, </a:t>
-            </a:r>
-          </a:p>
-          <a:p>
-            <a:pPr marL="82296" indent="0">
-              <a:buNone/>
-            </a:pPr>
-            <a:r>
-              <a:rPr lang="en-US" dirty="0" smtClean="0"/>
-              <a:t>representative and the bank, through a secure online transaction </a:t>
-            </a:r>
-          </a:p>
-          <a:p>
-            <a:endParaRPr lang="en-US" dirty="0"/>
-          </a:p>
-          <a:p>
-            <a:r>
-              <a:rPr lang="en-US" dirty="0" smtClean="0"/>
-              <a:t>Getaway: The secure line between the banks and the processor. </a:t>
-            </a:r>
-            <a:endParaRPr lang="en-US" dirty="0"/>
+              <a:rPr lang="en-GB" dirty="0" smtClean="0"/>
+              <a:t>Code to add items to cart:</a:t>
+            </a:r>
+            <a:endParaRPr lang="en-IE" dirty="0"/>
           </a:p>
         </p:txBody>
       </p:sp>
       <p:pic>
         <p:nvPicPr>
-          <p:cNvPr id="4" name="Picture 3"/>
+          <p:cNvPr id="7" name="Content Placeholder 6"/>
           <p:cNvPicPr>
-            <a:picLocks noChangeAspect="1"/>
+            <a:picLocks noGrp="1" noChangeAspect="1"/>
           </p:cNvPicPr>
-          <p:nvPr/>
+          <p:nvPr>
+            <p:ph sz="quarter" idx="2"/>
+          </p:nvPr>
         </p:nvPicPr>
         <p:blipFill>
-          <a:blip r:embed="rId2"/>
+          <a:blip r:embed="rId2">
+            <a:extLst>
+              <a:ext uri="{28A0092B-C50C-407E-A947-70E740481C1C}">
+                <a14:useLocalDpi xmlns:a14="http://schemas.microsoft.com/office/drawing/2010/main" val="0"/>
+              </a:ext>
+            </a:extLst>
+          </a:blip>
           <a:stretch>
             <a:fillRect/>
           </a:stretch>
         </p:blipFill>
         <p:spPr>
           <a:xfrm>
-            <a:off x="9293638" y="1199079"/>
-            <a:ext cx="1851439" cy="1928433"/>
-          </a:xfrm>
-          <a:prstGeom prst="rect">
-            <a:avLst/>
-          </a:prstGeom>
+            <a:off x="391886" y="826858"/>
+            <a:ext cx="5427023" cy="5847072"/>
+          </a:xfrm>
+        </p:spPr>
+      </p:pic>
+      <p:sp>
+        <p:nvSpPr>
+          <p:cNvPr id="5" name="Text Placeholder 4"/>
+          <p:cNvSpPr>
+            <a:spLocks noGrp="1"/>
+          </p:cNvSpPr>
+          <p:nvPr>
+            <p:ph type="body" sz="half" idx="3"/>
+          </p:nvPr>
+        </p:nvSpPr>
+        <p:spPr>
+          <a:xfrm>
+            <a:off x="6217920" y="186781"/>
+            <a:ext cx="5364480" cy="640080"/>
+          </a:xfrm>
+        </p:spPr>
+        <p:txBody>
+          <a:bodyPr/>
+          <a:lstStyle/>
+          <a:p>
+            <a:r>
+              <a:rPr lang="en-GB" dirty="0" smtClean="0"/>
+              <a:t>Item 1 and 2:</a:t>
+            </a:r>
+            <a:endParaRPr lang="en-IE" dirty="0"/>
+          </a:p>
+        </p:txBody>
+      </p:sp>
+      <p:pic>
+        <p:nvPicPr>
+          <p:cNvPr id="8" name="Content Placeholder 7"/>
+          <p:cNvPicPr>
+            <a:picLocks noGrp="1" noChangeAspect="1"/>
+          </p:cNvPicPr>
+          <p:nvPr>
+            <p:ph sz="quarter" idx="4"/>
+          </p:nvPr>
+        </p:nvPicPr>
+        <p:blipFill>
+          <a:blip r:embed="rId3">
+            <a:extLst>
+              <a:ext uri="{28A0092B-C50C-407E-A947-70E740481C1C}">
+                <a14:useLocalDpi xmlns:a14="http://schemas.microsoft.com/office/drawing/2010/main" val="0"/>
+              </a:ext>
+            </a:extLst>
+          </a:blip>
+          <a:stretch>
+            <a:fillRect/>
+          </a:stretch>
+        </p:blipFill>
+        <p:spPr>
+          <a:xfrm>
+            <a:off x="6217919" y="826859"/>
+            <a:ext cx="5364481" cy="5847071"/>
+          </a:xfrm>
         </p:spPr>
       </p:pic>
     </p:spTree>
     <p:extLst>
       <p:ext uri="{BB962C8B-B14F-4D97-AF65-F5344CB8AC3E}">
-        <p14:creationId xmlns:p14="http://schemas.microsoft.com/office/powerpoint/2010/main" val="1636465933"/>
+        <p14:creationId xmlns:p14="http://schemas.microsoft.com/office/powerpoint/2010/main" val="4291698707"/>
       </p:ext>
     </p:extLst>
   </p:cSld>
@@ -7820,6 +8098,15 @@
 </file>
 
 <file path=customXml/item2.xml><?xml version="1.0" encoding="utf-8"?>
+<?mso-contentType ?>
+<FormTemplates xmlns="http://schemas.microsoft.com/sharepoint/v3/contenttype/forms">
+  <Display>DocumentLibraryForm</Display>
+  <Edit>DocumentLibraryForm</Edit>
+  <New>DocumentLibraryForm</New>
+</FormTemplates>
+</file>
+
+<file path=customXml/item3.xml><?xml version="1.0" encoding="utf-8"?>
 <p:properties xmlns:p="http://schemas.microsoft.com/office/2006/metadata/properties" xmlns:xsi="http://www.w3.org/2001/XMLSchema-instance" xmlns:pc="http://schemas.microsoft.com/office/infopath/2007/PartnerControls">
   <documentManagement>
     <VSO_x0020_item_x0020_id xmlns="40262f94-9f35-4ac3-9a90-690165a166b7" xsi:nil="true"/>
@@ -7828,15 +8115,6 @@
     <Template_x0020_details xmlns="40262f94-9f35-4ac3-9a90-690165a166b7" xsi:nil="true"/>
   </documentManagement>
 </p:properties>
-</file>
-
-<file path=customXml/item3.xml><?xml version="1.0" encoding="utf-8"?>
-<?mso-contentType ?>
-<FormTemplates xmlns="http://schemas.microsoft.com/sharepoint/v3/contenttype/forms">
-  <Display>DocumentLibraryForm</Display>
-  <Edit>DocumentLibraryForm</Edit>
-  <New>DocumentLibraryForm</New>
-</FormTemplates>
 </file>
 
 <file path=customXml/itemProps1.xml><?xml version="1.0" encoding="utf-8"?>
@@ -7859,6 +8137,14 @@
 </file>
 
 <file path=customXml/itemProps2.xml><?xml version="1.0" encoding="utf-8"?>
+<ds:datastoreItem xmlns:ds="http://schemas.openxmlformats.org/officeDocument/2006/customXml" ds:itemID="{4DEB5BEE-6806-4BF1-A9A7-4B4A72C0C6EB}">
+  <ds:schemaRefs>
+    <ds:schemaRef ds:uri="http://schemas.microsoft.com/sharepoint/v3/contenttype/forms"/>
+  </ds:schemaRefs>
+</ds:datastoreItem>
+</file>
+
+<file path=customXml/itemProps3.xml><?xml version="1.0" encoding="utf-8"?>
 <ds:datastoreItem xmlns:ds="http://schemas.openxmlformats.org/officeDocument/2006/customXml" ds:itemID="{EEFED04C-AD43-4E06-AD63-36D8B5E83787}">
   <ds:schemaRefs>
     <ds:schemaRef ds:uri="a4f35948-e619-41b3-aa29-22878b09cfd2"/>
@@ -7873,12 +8159,4 @@
     <ds:schemaRef ds:uri="http://www.w3.org/XML/1998/namespace"/>
   </ds:schemaRefs>
 </ds:datastoreItem>
-</file>
-
-<file path=customXml/itemProps3.xml><?xml version="1.0" encoding="utf-8"?>
-<ds:datastoreItem xmlns:ds="http://schemas.openxmlformats.org/officeDocument/2006/customXml" ds:itemID="{4DEB5BEE-6806-4BF1-A9A7-4B4A72C0C6EB}">
-  <ds:schemaRefs>
-    <ds:schemaRef ds:uri="http://schemas.microsoft.com/sharepoint/v3/contenttype/forms"/>
-  </ds:schemaRefs>
-</ds:datastoreItem>
 </file>
</xml_diff>

<commit_message>
Combined mine and Jessica's..
</commit_message>
<xml_diff>
--- a/Week 8 - Presentation slides/Mid-Term Project.pptx
+++ b/Week 8 - Presentation slides/Mid-Term Project.pptx
@@ -5,10 +5,10 @@
     <p:sldMasterId id="2147483720" r:id="rId4"/>
   </p:sldMasterIdLst>
   <p:notesMasterIdLst>
-    <p:notesMasterId r:id="rId17"/>
+    <p:notesMasterId r:id="rId18"/>
   </p:notesMasterIdLst>
   <p:handoutMasterIdLst>
-    <p:handoutMasterId r:id="rId18"/>
+    <p:handoutMasterId r:id="rId19"/>
   </p:handoutMasterIdLst>
   <p:sldIdLst>
     <p:sldId id="257" r:id="rId5"/>
@@ -18,11 +18,12 @@
     <p:sldId id="267" r:id="rId9"/>
     <p:sldId id="268" r:id="rId10"/>
     <p:sldId id="265" r:id="rId11"/>
-    <p:sldId id="266" r:id="rId12"/>
-    <p:sldId id="261" r:id="rId13"/>
-    <p:sldId id="262" r:id="rId14"/>
-    <p:sldId id="263" r:id="rId15"/>
-    <p:sldId id="264" r:id="rId16"/>
+    <p:sldId id="269" r:id="rId12"/>
+    <p:sldId id="270" r:id="rId13"/>
+    <p:sldId id="261" r:id="rId14"/>
+    <p:sldId id="262" r:id="rId15"/>
+    <p:sldId id="263" r:id="rId16"/>
+    <p:sldId id="264" r:id="rId17"/>
   </p:sldIdLst>
   <p:sldSz cx="12192000" cy="6858000"/>
   <p:notesSz cx="6858000" cy="9144000"/>
@@ -4977,8 +4978,8 @@
           <a:lstStyle/>
           <a:p>
             <a:r>
-              <a:rPr lang="en-IE" dirty="0" smtClean="0"/>
-              <a:t>Progression:</a:t>
+              <a:rPr lang="en-US" dirty="0" smtClean="0"/>
+              <a:t>Current Issues:</a:t>
             </a:r>
             <a:endParaRPr lang="en-US" dirty="0"/>
           </a:p>
@@ -5002,82 +5003,81 @@
         </p:spPr>
         <p:txBody>
           <a:bodyPr>
-            <a:normAutofit fontScale="92500"/>
+            <a:normAutofit/>
           </a:bodyPr>
           <a:lstStyle/>
           <a:p>
             <a:r>
+              <a:rPr lang="en-US" dirty="0"/>
+              <a:t>Connecting the Database to Web </a:t>
+            </a:r>
+            <a:r>
+              <a:rPr lang="en-US" dirty="0" smtClean="0"/>
+              <a:t>Application. </a:t>
+            </a:r>
+            <a:endParaRPr lang="en-US" dirty="0"/>
+          </a:p>
+          <a:p>
+            <a:r>
+              <a:rPr lang="en-US" dirty="0"/>
+              <a:t>Learning </a:t>
+            </a:r>
+            <a:r>
+              <a:rPr lang="en-US" dirty="0" smtClean="0"/>
+              <a:t>PHP.</a:t>
+            </a:r>
+            <a:endParaRPr lang="en-US" dirty="0"/>
+          </a:p>
+          <a:p>
+            <a:r>
+              <a:rPr lang="en-US" dirty="0"/>
+              <a:t>Overall </a:t>
+            </a:r>
+            <a:r>
+              <a:rPr lang="en-US" dirty="0" smtClean="0"/>
+              <a:t>aesthetics. </a:t>
+            </a:r>
+            <a:endParaRPr lang="en-US" dirty="0"/>
+          </a:p>
+          <a:p>
+            <a:r>
               <a:rPr lang="en-IE" dirty="0"/>
-              <a:t>Connect the database to application</a:t>
-            </a:r>
-          </a:p>
-          <a:p>
-            <a:r>
-              <a:rPr lang="en-IE" dirty="0"/>
-              <a:t>Look and feel of the Web </a:t>
+              <a:t>Group </a:t>
             </a:r>
             <a:r>
               <a:rPr lang="en-IE" dirty="0" smtClean="0"/>
-              <a:t>Application</a:t>
+              <a:t>dynamics.</a:t>
             </a:r>
           </a:p>
           <a:p>
             <a:r>
               <a:rPr lang="en-GB" dirty="0" smtClean="0"/>
-              <a:t>Ensure our application is secure and accessible.</a:t>
-            </a:r>
-            <a:endParaRPr lang="en-IE" dirty="0"/>
-          </a:p>
-          <a:p>
-            <a:pPr marL="82296" indent="0">
-              <a:buNone/>
-            </a:pPr>
-            <a:endParaRPr lang="en-US" dirty="0" smtClean="0"/>
-          </a:p>
-          <a:p>
-            <a:pPr marL="82296" indent="0">
-              <a:buNone/>
-            </a:pPr>
-            <a:r>
-              <a:rPr lang="en-US" sz="4300" b="1" dirty="0" smtClean="0">
-                <a:solidFill>
-                  <a:srgbClr val="7B3D17"/>
-                </a:solidFill>
-              </a:rPr>
-              <a:t>Future Goals:</a:t>
-            </a:r>
-          </a:p>
-          <a:p>
-            <a:r>
-              <a:rPr lang="en-US" dirty="0" smtClean="0"/>
-              <a:t>Secure, Accessible and convenient Application.</a:t>
-            </a:r>
-            <a:endParaRPr lang="en-US" dirty="0"/>
-          </a:p>
-          <a:p>
-            <a:r>
-              <a:rPr lang="en-US" dirty="0" smtClean="0"/>
-              <a:t>To expand worldwide, not just Ireland based.</a:t>
-            </a:r>
-          </a:p>
-          <a:p>
-            <a:r>
-              <a:rPr lang="en-US" dirty="0" smtClean="0"/>
-              <a:t>Allow customers to book through booking systems set up around the country. E.g. Like the Luas tickets system.</a:t>
-            </a:r>
-          </a:p>
-          <a:p>
-            <a:pPr marL="82296" indent="0">
-              <a:buNone/>
-            </a:pPr>
-            <a:endParaRPr lang="en-US" dirty="0" smtClean="0"/>
+              <a:t>Visual Studios is new to three members of the group so we are still trying to get to grasps with it.</a:t>
+            </a:r>
+          </a:p>
+          <a:p>
+            <a:r>
+              <a:rPr lang="en-GB" dirty="0" smtClean="0"/>
+              <a:t>Security issues</a:t>
+            </a:r>
+            <a:r>
+              <a:rPr lang="en-GB" dirty="0" smtClean="0"/>
+              <a:t>.</a:t>
+            </a:r>
+          </a:p>
+          <a:p>
+            <a:r>
+              <a:rPr lang="en-GB" dirty="0" smtClean="0"/>
+              <a:t>Cookies.</a:t>
+            </a:r>
+            <a:endParaRPr lang="en-GB" dirty="0" smtClean="0"/>
           </a:p>
         </p:txBody>
       </p:sp>
     </p:spTree>
     <p:extLst>
       <p:ext uri="{BB962C8B-B14F-4D97-AF65-F5344CB8AC3E}">
-        <p14:creationId xmlns:p14="http://schemas.microsoft.com/office/powerpoint/2010/main" val="3066521872"/>
+        <p14:creationId xmlns:p14="http://schemas.microsoft.com/office/powerpoint/2010/main" val="3590482709"/>
       </p:ext>
     </p:extLst>
   </p:cSld>
@@ -5132,6 +5132,161 @@
           <a:lstStyle/>
           <a:p>
             <a:r>
+              <a:rPr lang="en-IE" dirty="0" smtClean="0"/>
+              <a:t>Progression:</a:t>
+            </a:r>
+            <a:endParaRPr lang="en-US" dirty="0"/>
+          </a:p>
+        </p:txBody>
+      </p:sp>
+      <p:sp>
+        <p:nvSpPr>
+          <p:cNvPr id="10" name="Content Placeholder 9"/>
+          <p:cNvSpPr>
+            <a:spLocks noGrp="1"/>
+          </p:cNvSpPr>
+          <p:nvPr>
+            <p:ph sz="half" idx="1"/>
+          </p:nvPr>
+        </p:nvSpPr>
+        <p:spPr>
+          <a:xfrm>
+            <a:off x="1914144" y="1524000"/>
+            <a:ext cx="9997440" cy="4663440"/>
+          </a:xfrm>
+        </p:spPr>
+        <p:txBody>
+          <a:bodyPr>
+            <a:normAutofit fontScale="92500"/>
+          </a:bodyPr>
+          <a:lstStyle/>
+          <a:p>
+            <a:r>
+              <a:rPr lang="en-IE" dirty="0"/>
+              <a:t>Connect the database to application</a:t>
+            </a:r>
+          </a:p>
+          <a:p>
+            <a:r>
+              <a:rPr lang="en-IE" dirty="0"/>
+              <a:t>Look and feel of the Web </a:t>
+            </a:r>
+            <a:r>
+              <a:rPr lang="en-IE" dirty="0" smtClean="0"/>
+              <a:t>Application</a:t>
+            </a:r>
+          </a:p>
+          <a:p>
+            <a:r>
+              <a:rPr lang="en-GB" dirty="0" smtClean="0"/>
+              <a:t>Ensure our application is secure and accessible.</a:t>
+            </a:r>
+            <a:endParaRPr lang="en-IE" dirty="0"/>
+          </a:p>
+          <a:p>
+            <a:pPr marL="82296" indent="0">
+              <a:buNone/>
+            </a:pPr>
+            <a:endParaRPr lang="en-US" dirty="0" smtClean="0"/>
+          </a:p>
+          <a:p>
+            <a:pPr marL="82296" indent="0">
+              <a:buNone/>
+            </a:pPr>
+            <a:r>
+              <a:rPr lang="en-US" sz="4300" b="1" dirty="0" smtClean="0">
+                <a:solidFill>
+                  <a:srgbClr val="7B3D17"/>
+                </a:solidFill>
+              </a:rPr>
+              <a:t>Future Goals:</a:t>
+            </a:r>
+          </a:p>
+          <a:p>
+            <a:r>
+              <a:rPr lang="en-US" dirty="0" smtClean="0"/>
+              <a:t>Secure, Accessible and convenient Application.</a:t>
+            </a:r>
+            <a:endParaRPr lang="en-US" dirty="0"/>
+          </a:p>
+          <a:p>
+            <a:r>
+              <a:rPr lang="en-US" dirty="0" smtClean="0"/>
+              <a:t>To expand worldwide, not just Ireland based.</a:t>
+            </a:r>
+          </a:p>
+          <a:p>
+            <a:r>
+              <a:rPr lang="en-US" dirty="0" smtClean="0"/>
+              <a:t>Allow customers to book through booking systems set up around the country. E.g. Like the Luas tickets system.</a:t>
+            </a:r>
+          </a:p>
+          <a:p>
+            <a:pPr marL="82296" indent="0">
+              <a:buNone/>
+            </a:pPr>
+            <a:endParaRPr lang="en-US" dirty="0" smtClean="0"/>
+          </a:p>
+        </p:txBody>
+      </p:sp>
+    </p:spTree>
+    <p:extLst>
+      <p:ext uri="{BB962C8B-B14F-4D97-AF65-F5344CB8AC3E}">
+        <p14:creationId xmlns:p14="http://schemas.microsoft.com/office/powerpoint/2010/main" val="3066521872"/>
+      </p:ext>
+    </p:extLst>
+  </p:cSld>
+  <p:clrMapOvr>
+    <a:masterClrMapping/>
+  </p:clrMapOvr>
+  <mc:AlternateContent xmlns:mc="http://schemas.openxmlformats.org/markup-compatibility/2006" xmlns:p14="http://schemas.microsoft.com/office/powerpoint/2010/main">
+    <mc:Choice Requires="p14">
+      <p:transition spd="med" p14:dur="700">
+        <p:fade/>
+      </p:transition>
+    </mc:Choice>
+    <mc:Fallback xmlns="">
+      <p:transition spd="med">
+        <p:fade/>
+      </p:transition>
+    </mc:Fallback>
+  </mc:AlternateContent>
+</p:sld>
+</file>
+
+<file path=ppt/slides/slide12.xml><?xml version="1.0" encoding="utf-8"?>
+<p:sld xmlns:a="http://schemas.openxmlformats.org/drawingml/2006/main" xmlns:r="http://schemas.openxmlformats.org/officeDocument/2006/relationships" xmlns:p="http://schemas.openxmlformats.org/presentationml/2006/main">
+  <p:cSld>
+    <p:spTree>
+      <p:nvGrpSpPr>
+        <p:cNvPr id="1" name=""/>
+        <p:cNvGrpSpPr/>
+        <p:nvPr/>
+      </p:nvGrpSpPr>
+      <p:grpSpPr>
+        <a:xfrm>
+          <a:off x="0" y="0"/>
+          <a:ext cx="0" cy="0"/>
+          <a:chOff x="0" y="0"/>
+          <a:chExt cx="0" cy="0"/>
+        </a:xfrm>
+      </p:grpSpPr>
+      <p:sp>
+        <p:nvSpPr>
+          <p:cNvPr id="2" name="Title 1"/>
+          <p:cNvSpPr>
+            <a:spLocks noGrp="1"/>
+          </p:cNvSpPr>
+          <p:nvPr>
+            <p:ph type="title"/>
+          </p:nvPr>
+        </p:nvSpPr>
+        <p:spPr/>
+        <p:txBody>
+          <a:bodyPr/>
+          <a:lstStyle/>
+          <a:p>
+            <a:r>
               <a:rPr lang="en-IE" dirty="0"/>
               <a:t>References</a:t>
             </a:r>
@@ -5230,7 +5385,7 @@
 </p:sld>
 </file>
 
-<file path=ppt/slides/slide12.xml><?xml version="1.0" encoding="utf-8"?>
+<file path=ppt/slides/slide13.xml><?xml version="1.0" encoding="utf-8"?>
 <p:sld xmlns:a="http://schemas.openxmlformats.org/drawingml/2006/main" xmlns:r="http://schemas.openxmlformats.org/officeDocument/2006/relationships" xmlns:p="http://schemas.openxmlformats.org/presentationml/2006/main">
   <p:cSld>
     <p:spTree>
@@ -5350,10 +5505,10 @@
           <a:lstStyle/>
           <a:p>
             <a:r>
-              <a:rPr lang="en-IE" u="sng" dirty="0" smtClean="0"/>
+              <a:rPr lang="en-IE" dirty="0" smtClean="0"/>
               <a:t>GOLDEN YEARS</a:t>
             </a:r>
-            <a:endParaRPr lang="en-US" u="sng" dirty="0"/>
+            <a:endParaRPr lang="en-US" dirty="0"/>
           </a:p>
         </p:txBody>
       </p:sp>
@@ -5506,10 +5661,10 @@
           <a:lstStyle/>
           <a:p>
             <a:r>
-              <a:rPr lang="en-US" u="sng" dirty="0" smtClean="0"/>
+              <a:rPr lang="en-US" dirty="0" smtClean="0"/>
               <a:t>Innovation:</a:t>
             </a:r>
-            <a:endParaRPr lang="en-US" u="sng" dirty="0"/>
+            <a:endParaRPr lang="en-US" dirty="0"/>
           </a:p>
         </p:txBody>
       </p:sp>
@@ -5664,10 +5819,10 @@
           <a:lstStyle/>
           <a:p>
             <a:r>
-              <a:rPr lang="en-US" u="sng" dirty="0" smtClean="0"/>
+              <a:rPr lang="en-US" dirty="0" smtClean="0"/>
               <a:t>Technologies used:</a:t>
             </a:r>
-            <a:endParaRPr lang="en-US" u="sng" dirty="0"/>
+            <a:endParaRPr lang="en-US" dirty="0"/>
           </a:p>
         </p:txBody>
       </p:sp>
@@ -6715,10 +6870,18 @@
           <a:lstStyle/>
           <a:p>
             <a:r>
-              <a:rPr lang="en-GB" sz="3600" u="sng" dirty="0" smtClean="0"/>
-              <a:t>Payment System:</a:t>
-            </a:r>
-            <a:endParaRPr lang="en-IE" sz="3600" u="sng" dirty="0"/>
+              <a:rPr lang="en-GB" sz="3600" dirty="0" smtClean="0"/>
+              <a:t>Payment </a:t>
+            </a:r>
+            <a:r>
+              <a:rPr lang="en-GB" sz="3600" dirty="0" smtClean="0"/>
+              <a:t>Getaway System</a:t>
+            </a:r>
+            <a:r>
+              <a:rPr lang="en-GB" sz="3600" dirty="0" smtClean="0"/>
+              <a:t>:</a:t>
+            </a:r>
+            <a:endParaRPr lang="en-IE" sz="3600" dirty="0"/>
           </a:p>
         </p:txBody>
       </p:sp>
@@ -6732,76 +6895,93 @@
             <p:ph idx="1"/>
           </p:nvPr>
         </p:nvSpPr>
-        <p:spPr/>
+        <p:spPr>
+          <a:xfrm>
+            <a:off x="1914144" y="1692276"/>
+            <a:ext cx="9997440" cy="4556124"/>
+          </a:xfrm>
+        </p:spPr>
         <p:txBody>
           <a:bodyPr>
-            <a:normAutofit fontScale="92500" lnSpcReduction="10000"/>
+            <a:normAutofit/>
           </a:bodyPr>
           <a:lstStyle/>
           <a:p>
             <a:r>
+              <a:rPr lang="en-GB" dirty="0" smtClean="0"/>
+              <a:t>Protect </a:t>
+            </a:r>
+            <a:r>
               <a:rPr lang="en-GB" dirty="0"/>
-              <a:t>Adding  event to </a:t>
-            </a:r>
-            <a:r>
-              <a:rPr lang="en-GB" dirty="0" smtClean="0"/>
-              <a:t>cart</a:t>
-            </a:r>
-          </a:p>
-          <a:p>
-            <a:r>
-              <a:rPr lang="en-GB" dirty="0" smtClean="0"/>
-              <a:t>Security / Encryption</a:t>
-            </a:r>
-          </a:p>
-          <a:p>
-            <a:r>
-              <a:rPr lang="en-GB" dirty="0" smtClean="0"/>
-              <a:t>Card details. </a:t>
-            </a:r>
-          </a:p>
-          <a:p>
-            <a:r>
-              <a:rPr lang="en-GB" dirty="0" smtClean="0"/>
-              <a:t>Cookies</a:t>
-            </a:r>
-          </a:p>
-          <a:p>
-            <a:r>
-              <a:rPr lang="en-GB" dirty="0" smtClean="0"/>
-              <a:t>Acceptance</a:t>
-            </a:r>
+              <a:t>credit cards details encrypting sensitive information </a:t>
+            </a:r>
+          </a:p>
+          <a:p>
+            <a:endParaRPr lang="en-GB" dirty="0"/>
+          </a:p>
+          <a:p>
             <a:r>
               <a:rPr lang="en-GB" dirty="0"/>
-              <a:t>/ Verification </a:t>
-            </a:r>
-            <a:r>
-              <a:rPr lang="en-GB" dirty="0" smtClean="0"/>
-              <a:t>of payment </a:t>
-            </a:r>
+              <a:t>It ensure that information pass securely. </a:t>
+            </a:r>
+          </a:p>
+          <a:p>
+            <a:endParaRPr lang="en-GB" dirty="0"/>
+          </a:p>
+          <a:p>
+            <a:pPr marL="82296" indent="0">
+              <a:buNone/>
+            </a:pPr>
+            <a:r>
+              <a:rPr lang="en-GB" sz="3600" b="1" dirty="0" smtClean="0">
+                <a:solidFill>
+                  <a:schemeClr val="accent2">
+                    <a:lumMod val="50000"/>
+                  </a:schemeClr>
+                </a:solidFill>
+              </a:rPr>
+              <a:t>Security: </a:t>
+            </a:r>
+            <a:endParaRPr lang="en-GB" sz="3600" b="1" dirty="0">
+              <a:solidFill>
+                <a:schemeClr val="accent2">
+                  <a:lumMod val="50000"/>
+                </a:schemeClr>
+              </a:solidFill>
+            </a:endParaRPr>
+          </a:p>
+          <a:p>
             <a:r>
               <a:rPr lang="en-GB" dirty="0"/>
-              <a:t>( credit cards only</a:t>
-            </a:r>
-            <a:r>
-              <a:rPr lang="en-GB" dirty="0" smtClean="0"/>
-              <a:t>)</a:t>
-            </a:r>
-          </a:p>
-          <a:p>
-            <a:r>
-              <a:rPr lang="en-GB" dirty="0" smtClean="0"/>
-              <a:t>After booking it automatically adds to our booking Calendar.</a:t>
-            </a:r>
-          </a:p>
-          <a:p>
-            <a:r>
-              <a:rPr lang="en-GB" dirty="0" smtClean="0"/>
-              <a:t>Automatic confirmation email sent to confirm payment and booking.</a:t>
-            </a:r>
-          </a:p>
-        </p:txBody>
-      </p:sp>
+              <a:t>Customers will be asked to enter their details when making payment. </a:t>
+            </a:r>
+          </a:p>
+        </p:txBody>
+      </p:sp>
+      <p:pic>
+        <p:nvPicPr>
+          <p:cNvPr id="4" name="Picture 3"/>
+          <p:cNvPicPr>
+            <a:picLocks noChangeAspect="1"/>
+          </p:cNvPicPr>
+          <p:nvPr/>
+        </p:nvPicPr>
+        <p:blipFill>
+          <a:blip r:embed="rId2"/>
+          <a:stretch>
+            <a:fillRect/>
+          </a:stretch>
+        </p:blipFill>
+        <p:spPr>
+          <a:xfrm>
+            <a:off x="9680437" y="92282"/>
+            <a:ext cx="1586396" cy="1599994"/>
+          </a:xfrm>
+          <a:prstGeom prst="rect">
+            <a:avLst/>
+          </a:prstGeom>
+        </p:spPr>
+      </p:pic>
     </p:spTree>
     <p:extLst>
       <p:ext uri="{BB962C8B-B14F-4D97-AF65-F5344CB8AC3E}">
@@ -6846,122 +7026,155 @@
       </p:grpSpPr>
       <p:sp>
         <p:nvSpPr>
-          <p:cNvPr id="3" name="Text Placeholder 2"/>
-          <p:cNvSpPr>
-            <a:spLocks noGrp="1"/>
-          </p:cNvSpPr>
-          <p:nvPr>
-            <p:ph type="body" idx="1"/>
-          </p:nvPr>
-        </p:nvSpPr>
-        <p:spPr>
-          <a:xfrm>
-            <a:off x="391885" y="186781"/>
-            <a:ext cx="5427024" cy="640080"/>
-          </a:xfrm>
-        </p:spPr>
+          <p:cNvPr id="2" name="Title 1"/>
+          <p:cNvSpPr>
+            <a:spLocks noGrp="1"/>
+          </p:cNvSpPr>
+          <p:nvPr>
+            <p:ph type="title"/>
+          </p:nvPr>
+        </p:nvSpPr>
+        <p:spPr/>
         <p:txBody>
           <a:bodyPr/>
           <a:lstStyle/>
           <a:p>
             <a:r>
-              <a:rPr lang="en-GB" dirty="0" smtClean="0"/>
-              <a:t>Code to add items to cart:</a:t>
-            </a:r>
+              <a:rPr lang="en-IE" dirty="0" smtClean="0"/>
+              <a:t>Payment Security Cont…</a:t>
+            </a:r>
+            <a:endParaRPr lang="en-IE" dirty="0"/>
+          </a:p>
+        </p:txBody>
+      </p:sp>
+      <p:sp>
+        <p:nvSpPr>
+          <p:cNvPr id="3" name="Content Placeholder 2"/>
+          <p:cNvSpPr>
+            <a:spLocks noGrp="1"/>
+          </p:cNvSpPr>
+          <p:nvPr>
+            <p:ph idx="1"/>
+          </p:nvPr>
+        </p:nvSpPr>
+        <p:spPr/>
+        <p:txBody>
+          <a:bodyPr>
+            <a:normAutofit lnSpcReduction="10000"/>
+          </a:bodyPr>
+          <a:lstStyle/>
+          <a:p>
+            <a:r>
+              <a:rPr lang="en-GB" dirty="0">
+                <a:solidFill>
+                  <a:schemeClr val="tx2">
+                    <a:lumMod val="50000"/>
+                  </a:schemeClr>
+                </a:solidFill>
+              </a:rPr>
+              <a:t>The entire communication of the ‘submit page’ will be carried out by http protocol </a:t>
+            </a:r>
+          </a:p>
+          <a:p>
+            <a:endParaRPr lang="en-GB" dirty="0">
+              <a:solidFill>
+                <a:schemeClr val="tx2">
+                  <a:lumMod val="50000"/>
+                </a:schemeClr>
+              </a:solidFill>
+            </a:endParaRPr>
+          </a:p>
+          <a:p>
+            <a:r>
+              <a:rPr lang="en-GB" dirty="0">
+                <a:solidFill>
+                  <a:schemeClr val="tx2">
+                    <a:lumMod val="50000"/>
+                  </a:schemeClr>
+                </a:solidFill>
+              </a:rPr>
+              <a:t> The payment network provides process and service </a:t>
+            </a:r>
+          </a:p>
+          <a:p>
+            <a:endParaRPr lang="en-GB" dirty="0">
+              <a:solidFill>
+                <a:schemeClr val="tx2">
+                  <a:lumMod val="50000"/>
+                </a:schemeClr>
+              </a:solidFill>
+            </a:endParaRPr>
+          </a:p>
+          <a:p>
+            <a:pPr marL="82296" indent="0">
+              <a:buNone/>
+            </a:pPr>
+            <a:r>
+              <a:rPr lang="en-GB" dirty="0">
+                <a:solidFill>
+                  <a:srgbClr val="7B3D17"/>
+                </a:solidFill>
+              </a:rPr>
+              <a:t>Process</a:t>
+            </a:r>
+          </a:p>
+          <a:p>
+            <a:r>
+              <a:rPr lang="en-GB" dirty="0">
+                <a:solidFill>
+                  <a:schemeClr val="tx2">
+                    <a:lumMod val="50000"/>
+                  </a:schemeClr>
+                </a:solidFill>
+              </a:rPr>
+              <a:t>Authorisation </a:t>
+            </a:r>
+          </a:p>
+          <a:p>
+            <a:r>
+              <a:rPr lang="en-GB" dirty="0">
+                <a:solidFill>
+                  <a:schemeClr val="tx2">
+                    <a:lumMod val="50000"/>
+                  </a:schemeClr>
+                </a:solidFill>
+              </a:rPr>
+              <a:t>Settlement </a:t>
+            </a:r>
+          </a:p>
+          <a:p>
             <a:endParaRPr lang="en-IE" dirty="0"/>
           </a:p>
         </p:txBody>
       </p:sp>
       <p:pic>
         <p:nvPicPr>
-          <p:cNvPr id="7" name="Content Placeholder 6"/>
+          <p:cNvPr id="4" name="Picture 3"/>
           <p:cNvPicPr>
-            <a:picLocks noGrp="1" noChangeAspect="1"/>
+            <a:picLocks noChangeAspect="1"/>
           </p:cNvPicPr>
-          <p:nvPr>
-            <p:ph sz="quarter" idx="2"/>
-          </p:nvPr>
+          <p:nvPr/>
         </p:nvPicPr>
         <p:blipFill>
-          <a:blip r:embed="rId2">
-            <a:extLst>
-              <a:ext uri="{28A0092B-C50C-407E-A947-70E740481C1C}">
-                <a14:useLocalDpi xmlns:a14="http://schemas.microsoft.com/office/drawing/2010/main" val="0"/>
-              </a:ext>
-            </a:extLst>
-          </a:blip>
+          <a:blip r:embed="rId2"/>
           <a:stretch>
             <a:fillRect/>
           </a:stretch>
         </p:blipFill>
         <p:spPr>
           <a:xfrm>
-            <a:off x="391886" y="826858"/>
-            <a:ext cx="5427023" cy="5847072"/>
-          </a:xfrm>
-        </p:spPr>
-      </p:pic>
-      <p:sp>
-        <p:nvSpPr>
-          <p:cNvPr id="5" name="Text Placeholder 4"/>
-          <p:cNvSpPr>
-            <a:spLocks noGrp="1"/>
-          </p:cNvSpPr>
-          <p:nvPr>
-            <p:ph type="body" sz="half" idx="3"/>
-          </p:nvPr>
-        </p:nvSpPr>
-        <p:spPr>
-          <a:xfrm>
-            <a:off x="6217920" y="186781"/>
-            <a:ext cx="5364480" cy="640080"/>
-          </a:xfrm>
-        </p:spPr>
-        <p:txBody>
-          <a:bodyPr/>
-          <a:lstStyle/>
-          <a:p>
-            <a:r>
-              <a:rPr lang="en-GB" dirty="0" smtClean="0"/>
-              <a:t>Item 1 and 2:</a:t>
-            </a:r>
-            <a:endParaRPr lang="en-IE" dirty="0"/>
-          </a:p>
-        </p:txBody>
-      </p:sp>
-      <p:pic>
-        <p:nvPicPr>
-          <p:cNvPr id="8" name="Content Placeholder 7"/>
-          <p:cNvPicPr>
-            <a:picLocks noGrp="1" noChangeAspect="1"/>
-          </p:cNvPicPr>
-          <p:nvPr>
-            <p:ph sz="quarter" idx="4"/>
-          </p:nvPr>
-        </p:nvPicPr>
-        <p:blipFill>
-          <a:blip r:embed="rId3">
-            <a:extLst>
-              <a:ext uri="{28A0092B-C50C-407E-A947-70E740481C1C}">
-                <a14:useLocalDpi xmlns:a14="http://schemas.microsoft.com/office/drawing/2010/main" val="0"/>
-              </a:ext>
-            </a:extLst>
-          </a:blip>
-          <a:stretch>
-            <a:fillRect/>
-          </a:stretch>
-        </p:blipFill>
-        <p:spPr>
-          <a:xfrm>
-            <a:off x="6217919" y="826859"/>
-            <a:ext cx="5364481" cy="5847071"/>
-          </a:xfrm>
+            <a:off x="7889737" y="4223300"/>
+            <a:ext cx="3410764" cy="1855857"/>
+          </a:xfrm>
+          <a:prstGeom prst="rect">
+            <a:avLst/>
+          </a:prstGeom>
         </p:spPr>
       </p:pic>
     </p:spTree>
     <p:extLst>
       <p:ext uri="{BB962C8B-B14F-4D97-AF65-F5344CB8AC3E}">
-        <p14:creationId xmlns:p14="http://schemas.microsoft.com/office/powerpoint/2010/main" val="4291698707"/>
+        <p14:creationId xmlns:p14="http://schemas.microsoft.com/office/powerpoint/2010/main" val="1074776750"/>
       </p:ext>
     </p:extLst>
   </p:cSld>
@@ -7016,95 +7229,99 @@
           <a:lstStyle/>
           <a:p>
             <a:r>
-              <a:rPr lang="en-US" dirty="0" smtClean="0"/>
-              <a:t>Current Issues:</a:t>
-            </a:r>
+              <a:rPr lang="en-IE" dirty="0" smtClean="0"/>
+              <a:t>Service:</a:t>
+            </a:r>
+            <a:endParaRPr lang="en-IE" dirty="0"/>
+          </a:p>
+        </p:txBody>
+      </p:sp>
+      <p:sp>
+        <p:nvSpPr>
+          <p:cNvPr id="3" name="Content Placeholder 2"/>
+          <p:cNvSpPr>
+            <a:spLocks noGrp="1"/>
+          </p:cNvSpPr>
+          <p:nvPr>
+            <p:ph idx="1"/>
+          </p:nvPr>
+        </p:nvSpPr>
+        <p:spPr/>
+        <p:txBody>
+          <a:bodyPr/>
+          <a:lstStyle/>
+          <a:p>
+            <a:pPr marL="82296" indent="0">
+              <a:buNone/>
+            </a:pPr>
+            <a:r>
+              <a:rPr lang="en-US" dirty="0"/>
+              <a:t>Payment processing service:</a:t>
+            </a:r>
+          </a:p>
+          <a:p>
             <a:endParaRPr lang="en-US" dirty="0"/>
           </a:p>
-        </p:txBody>
-      </p:sp>
-      <p:sp>
-        <p:nvSpPr>
-          <p:cNvPr id="10" name="Content Placeholder 9"/>
-          <p:cNvSpPr>
-            <a:spLocks noGrp="1"/>
-          </p:cNvSpPr>
-          <p:nvPr>
-            <p:ph sz="half" idx="1"/>
-          </p:nvPr>
-        </p:nvSpPr>
-        <p:spPr>
-          <a:xfrm>
-            <a:off x="1914144" y="1524000"/>
-            <a:ext cx="9997440" cy="4663440"/>
-          </a:xfrm>
-        </p:spPr>
-        <p:txBody>
-          <a:bodyPr>
-            <a:normAutofit/>
-          </a:bodyPr>
-          <a:lstStyle/>
           <a:p>
             <a:r>
               <a:rPr lang="en-US" dirty="0"/>
-              <a:t>Connecting the Database to Web </a:t>
-            </a:r>
-            <a:r>
-              <a:rPr lang="en-US" dirty="0" smtClean="0"/>
-              <a:t>Application. </a:t>
-            </a:r>
+              <a:t>Connecting the customers, </a:t>
+            </a:r>
+          </a:p>
+          <a:p>
+            <a:pPr marL="82296" indent="0">
+              <a:buNone/>
+            </a:pPr>
+            <a:r>
+              <a:rPr lang="en-US" dirty="0"/>
+              <a:t>representative and the bank, through a secure online transaction </a:t>
+            </a:r>
+          </a:p>
+          <a:p>
             <a:endParaRPr lang="en-US" dirty="0"/>
           </a:p>
           <a:p>
             <a:r>
               <a:rPr lang="en-US" dirty="0"/>
-              <a:t>Learning </a:t>
-            </a:r>
-            <a:r>
-              <a:rPr lang="en-US" dirty="0" smtClean="0"/>
-              <a:t>PHP.</a:t>
-            </a:r>
-            <a:endParaRPr lang="en-US" dirty="0"/>
-          </a:p>
-          <a:p>
-            <a:r>
-              <a:rPr lang="en-US" dirty="0"/>
-              <a:t>Overall </a:t>
-            </a:r>
-            <a:r>
-              <a:rPr lang="en-US" dirty="0" smtClean="0"/>
-              <a:t>aesthetics. </a:t>
-            </a:r>
-            <a:endParaRPr lang="en-US" dirty="0"/>
-          </a:p>
-          <a:p>
-            <a:r>
-              <a:rPr lang="en-IE" dirty="0"/>
-              <a:t>Group </a:t>
-            </a:r>
-            <a:r>
-              <a:rPr lang="en-IE" dirty="0" smtClean="0"/>
-              <a:t>dynamics.</a:t>
-            </a:r>
-          </a:p>
-          <a:p>
-            <a:r>
-              <a:rPr lang="en-GB" dirty="0" smtClean="0"/>
-              <a:t>Visual Studios is new to three members of the group so we are still trying to get to grasps with it.</a:t>
-            </a:r>
-          </a:p>
-          <a:p>
-            <a:r>
-              <a:rPr lang="en-GB" dirty="0" smtClean="0"/>
-              <a:t>Security issues.</a:t>
-            </a:r>
-          </a:p>
-        </p:txBody>
-      </p:sp>
+              <a:t>Getaway: The secure line between the banks and the processor. </a:t>
+            </a:r>
+          </a:p>
+          <a:p>
+            <a:pPr marL="82296" indent="0">
+              <a:buNone/>
+            </a:pPr>
+            <a:endParaRPr lang="en-IE" dirty="0"/>
+          </a:p>
+        </p:txBody>
+      </p:sp>
+      <p:pic>
+        <p:nvPicPr>
+          <p:cNvPr id="4" name="Picture 3"/>
+          <p:cNvPicPr>
+            <a:picLocks noChangeAspect="1"/>
+          </p:cNvPicPr>
+          <p:nvPr/>
+        </p:nvPicPr>
+        <p:blipFill>
+          <a:blip r:embed="rId2"/>
+          <a:stretch>
+            <a:fillRect/>
+          </a:stretch>
+        </p:blipFill>
+        <p:spPr>
+          <a:xfrm>
+            <a:off x="9350788" y="627579"/>
+            <a:ext cx="1851439" cy="1928433"/>
+          </a:xfrm>
+          <a:prstGeom prst="rect">
+            <a:avLst/>
+          </a:prstGeom>
+        </p:spPr>
+      </p:pic>
     </p:spTree>
     <p:extLst>
       <p:ext uri="{BB962C8B-B14F-4D97-AF65-F5344CB8AC3E}">
-        <p14:creationId xmlns:p14="http://schemas.microsoft.com/office/powerpoint/2010/main" val="3590482709"/>
+        <p14:creationId xmlns:p14="http://schemas.microsoft.com/office/powerpoint/2010/main" val="2189922240"/>
       </p:ext>
     </p:extLst>
   </p:cSld>
@@ -7917,6 +8134,26 @@
 </file>
 
 <file path=customXml/item1.xml><?xml version="1.0" encoding="utf-8"?>
+<p:properties xmlns:p="http://schemas.microsoft.com/office/2006/metadata/properties" xmlns:xsi="http://www.w3.org/2001/XMLSchema-instance" xmlns:pc="http://schemas.microsoft.com/office/infopath/2007/PartnerControls">
+  <documentManagement>
+    <VSO_x0020_item_x0020_id xmlns="40262f94-9f35-4ac3-9a90-690165a166b7" xsi:nil="true"/>
+    <Assetid_x0020_ xmlns="40262f94-9f35-4ac3-9a90-690165a166b7" xsi:nil="true"/>
+    <Item_x0020_Details xmlns="40262f94-9f35-4ac3-9a90-690165a166b7" xsi:nil="true"/>
+    <Template_x0020_details xmlns="40262f94-9f35-4ac3-9a90-690165a166b7" xsi:nil="true"/>
+  </documentManagement>
+</p:properties>
+</file>
+
+<file path=customXml/item2.xml><?xml version="1.0" encoding="utf-8"?>
+<?mso-contentType ?>
+<FormTemplates xmlns="http://schemas.microsoft.com/sharepoint/v3/contenttype/forms">
+  <Display>DocumentLibraryForm</Display>
+  <Edit>DocumentLibraryForm</Edit>
+  <New>DocumentLibraryForm</New>
+</FormTemplates>
+</file>
+
+<file path=customXml/item3.xml><?xml version="1.0" encoding="utf-8"?>
 <ct:contentTypeSchema xmlns:ct="http://schemas.microsoft.com/office/2006/metadata/contentType" xmlns:ma="http://schemas.microsoft.com/office/2006/metadata/properties/metaAttributes" ct:_="" ma:_="" ma:contentTypeName="Document" ma:contentTypeID="0x010100AA3F7D94069FF64A86F7DFF56D60E3BE" ma:contentTypeVersion="6" ma:contentTypeDescription="Create a new document." ma:contentTypeScope="" ma:versionID="c32302c77d4085ecf495bdddb7f5e889">
   <xsd:schema xmlns:xsd="http://www.w3.org/2001/XMLSchema" xmlns:xs="http://www.w3.org/2001/XMLSchema" xmlns:p="http://schemas.microsoft.com/office/2006/metadata/properties" xmlns:ns2="a4f35948-e619-41b3-aa29-22878b09cfd2" xmlns:ns3="40262f94-9f35-4ac3-9a90-690165a166b7" targetNamespace="http://schemas.microsoft.com/office/2006/metadata/properties" ma:root="true" ma:fieldsID="4ab5ae46be95f9d0be6107e8200be7a2" ns2:_="" ns3:_="">
     <xsd:import namespace="a4f35948-e619-41b3-aa29-22878b09cfd2"/>
@@ -8097,27 +8334,32 @@
 </ct:contentTypeSchema>
 </file>
 
-<file path=customXml/item2.xml><?xml version="1.0" encoding="utf-8"?>
-<?mso-contentType ?>
-<FormTemplates xmlns="http://schemas.microsoft.com/sharepoint/v3/contenttype/forms">
-  <Display>DocumentLibraryForm</Display>
-  <Edit>DocumentLibraryForm</Edit>
-  <New>DocumentLibraryForm</New>
-</FormTemplates>
+<file path=customXml/itemProps1.xml><?xml version="1.0" encoding="utf-8"?>
+<ds:datastoreItem xmlns:ds="http://schemas.openxmlformats.org/officeDocument/2006/customXml" ds:itemID="{EEFED04C-AD43-4E06-AD63-36D8B5E83787}">
+  <ds:schemaRefs>
+    <ds:schemaRef ds:uri="a4f35948-e619-41b3-aa29-22878b09cfd2"/>
+    <ds:schemaRef ds:uri="http://purl.org/dc/terms/"/>
+    <ds:schemaRef ds:uri="http://schemas.microsoft.com/office/2006/documentManagement/types"/>
+    <ds:schemaRef ds:uri="http://schemas.microsoft.com/office/2006/metadata/properties"/>
+    <ds:schemaRef ds:uri="40262f94-9f35-4ac3-9a90-690165a166b7"/>
+    <ds:schemaRef ds:uri="http://purl.org/dc/dcmitype/"/>
+    <ds:schemaRef ds:uri="http://purl.org/dc/elements/1.1/"/>
+    <ds:schemaRef ds:uri="http://schemas.microsoft.com/office/infopath/2007/PartnerControls"/>
+    <ds:schemaRef ds:uri="http://schemas.openxmlformats.org/package/2006/metadata/core-properties"/>
+    <ds:schemaRef ds:uri="http://www.w3.org/XML/1998/namespace"/>
+  </ds:schemaRefs>
+</ds:datastoreItem>
 </file>
 
-<file path=customXml/item3.xml><?xml version="1.0" encoding="utf-8"?>
-<p:properties xmlns:p="http://schemas.microsoft.com/office/2006/metadata/properties" xmlns:xsi="http://www.w3.org/2001/XMLSchema-instance" xmlns:pc="http://schemas.microsoft.com/office/infopath/2007/PartnerControls">
-  <documentManagement>
-    <VSO_x0020_item_x0020_id xmlns="40262f94-9f35-4ac3-9a90-690165a166b7" xsi:nil="true"/>
-    <Assetid_x0020_ xmlns="40262f94-9f35-4ac3-9a90-690165a166b7" xsi:nil="true"/>
-    <Item_x0020_Details xmlns="40262f94-9f35-4ac3-9a90-690165a166b7" xsi:nil="true"/>
-    <Template_x0020_details xmlns="40262f94-9f35-4ac3-9a90-690165a166b7" xsi:nil="true"/>
-  </documentManagement>
-</p:properties>
+<file path=customXml/itemProps2.xml><?xml version="1.0" encoding="utf-8"?>
+<ds:datastoreItem xmlns:ds="http://schemas.openxmlformats.org/officeDocument/2006/customXml" ds:itemID="{4DEB5BEE-6806-4BF1-A9A7-4B4A72C0C6EB}">
+  <ds:schemaRefs>
+    <ds:schemaRef ds:uri="http://schemas.microsoft.com/sharepoint/v3/contenttype/forms"/>
+  </ds:schemaRefs>
+</ds:datastoreItem>
 </file>
 
-<file path=customXml/itemProps1.xml><?xml version="1.0" encoding="utf-8"?>
+<file path=customXml/itemProps3.xml><?xml version="1.0" encoding="utf-8"?>
 <ds:datastoreItem xmlns:ds="http://schemas.openxmlformats.org/officeDocument/2006/customXml" ds:itemID="{B0710C29-A897-44AD-9F83-BE5F874C2AEE}">
   <ds:schemaRefs>
     <ds:schemaRef ds:uri="http://schemas.microsoft.com/office/2006/metadata/contentType"/>
@@ -8134,29 +8376,4 @@
     <ds:schemaRef ds:uri="http://schemas.microsoft.com/internal/obd"/>
   </ds:schemaRefs>
 </ds:datastoreItem>
-</file>
-
-<file path=customXml/itemProps2.xml><?xml version="1.0" encoding="utf-8"?>
-<ds:datastoreItem xmlns:ds="http://schemas.openxmlformats.org/officeDocument/2006/customXml" ds:itemID="{4DEB5BEE-6806-4BF1-A9A7-4B4A72C0C6EB}">
-  <ds:schemaRefs>
-    <ds:schemaRef ds:uri="http://schemas.microsoft.com/sharepoint/v3/contenttype/forms"/>
-  </ds:schemaRefs>
-</ds:datastoreItem>
-</file>
-
-<file path=customXml/itemProps3.xml><?xml version="1.0" encoding="utf-8"?>
-<ds:datastoreItem xmlns:ds="http://schemas.openxmlformats.org/officeDocument/2006/customXml" ds:itemID="{EEFED04C-AD43-4E06-AD63-36D8B5E83787}">
-  <ds:schemaRefs>
-    <ds:schemaRef ds:uri="a4f35948-e619-41b3-aa29-22878b09cfd2"/>
-    <ds:schemaRef ds:uri="http://purl.org/dc/terms/"/>
-    <ds:schemaRef ds:uri="http://schemas.microsoft.com/office/2006/documentManagement/types"/>
-    <ds:schemaRef ds:uri="http://schemas.microsoft.com/office/2006/metadata/properties"/>
-    <ds:schemaRef ds:uri="40262f94-9f35-4ac3-9a90-690165a166b7"/>
-    <ds:schemaRef ds:uri="http://purl.org/dc/dcmitype/"/>
-    <ds:schemaRef ds:uri="http://purl.org/dc/elements/1.1/"/>
-    <ds:schemaRef ds:uri="http://schemas.microsoft.com/office/infopath/2007/PartnerControls"/>
-    <ds:schemaRef ds:uri="http://schemas.openxmlformats.org/package/2006/metadata/core-properties"/>
-    <ds:schemaRef ds:uri="http://www.w3.org/XML/1998/namespace"/>
-  </ds:schemaRefs>
-</ds:datastoreItem>
 </file>
</xml_diff>